<commit_message>
feat: add more info
</commit_message>
<xml_diff>
--- a/01-promise-2021/聊聊 Promise-手写完整的 Promise.pptx
+++ b/01-promise-2021/聊聊 Promise-手写完整的 Promise.pptx
@@ -3497,7 +3497,7 @@
         </p:nvSpPr>
         <p:spPr>
           <a:xfrm>
-            <a:off x="3787063" y="3550426"/>
+            <a:off x="2838892" y="3548644"/>
             <a:ext cx="8618477" cy="523220"/>
           </a:xfrm>
           <a:prstGeom prst="rect">
@@ -5146,8 +5146,8 @@
         </p:nvSpPr>
         <p:spPr>
           <a:xfrm>
-            <a:off x="1485571" y="1379407"/>
-            <a:ext cx="7598615" cy="2677656"/>
+            <a:off x="1496062" y="1208952"/>
+            <a:ext cx="8726578" cy="4524315"/>
           </a:xfrm>
           <a:prstGeom prst="rect">
             <a:avLst/>
@@ -5166,15 +5166,15 @@
                   <a:schemeClr val="bg1"/>
                 </a:solidFill>
               </a:rPr>
-              <a:t>咋一看可能无从下手，但只要我们跟随着 </a:t>
-            </a:r>
-            <a:r>
-              <a:rPr lang="en" altLang="zh-CN" sz="2400" b="1" dirty="0">
-                <a:solidFill>
-                  <a:schemeClr val="bg1"/>
-                </a:solidFill>
-              </a:rPr>
-              <a:t>Promises/A+ </a:t>
+              <a:t>咋一看可能无从下手，但如果你知道 </a:t>
+            </a:r>
+            <a:r>
+              <a:rPr lang="en-US" altLang="zh-CN" sz="2400" b="1" dirty="0">
+                <a:solidFill>
+                  <a:schemeClr val="bg1"/>
+                </a:solidFill>
+              </a:rPr>
+              <a:t>Promises/A+</a:t>
             </a:r>
             <a:r>
               <a:rPr lang="zh-CN" altLang="en-US" sz="2400" b="1" dirty="0">
@@ -5182,7 +5182,7 @@
                   <a:schemeClr val="bg1"/>
                 </a:solidFill>
               </a:rPr>
-              <a:t>规范一步一步地实现，你会发现，原来实现一个 </a:t>
+              <a:t> 规范，跟随着这一规范一步一步地实现，你会发现，原来实现一个 </a:t>
             </a:r>
             <a:r>
               <a:rPr lang="en" altLang="zh-CN" sz="2400" b="1" dirty="0">
@@ -5214,6 +5214,140 @@
             </a:endParaRPr>
           </a:p>
           <a:p>
+            <a:r>
+              <a:rPr lang="en" altLang="zh-CN" sz="2400" b="1" dirty="0">
+                <a:solidFill>
+                  <a:schemeClr val="bg1"/>
+                </a:solidFill>
+              </a:rPr>
+              <a:t>Promise</a:t>
+            </a:r>
+            <a:r>
+              <a:rPr lang="zh-CN" altLang="en-US" sz="2400" b="1" dirty="0">
+                <a:solidFill>
+                  <a:schemeClr val="bg1"/>
+                </a:solidFill>
+              </a:rPr>
+              <a:t> 规范最早由社区提出，其中普遍接受的是由</a:t>
+            </a:r>
+            <a:r>
+              <a:rPr lang="en-US" altLang="zh-CN" sz="2400" b="1" dirty="0" err="1">
+                <a:solidFill>
+                  <a:schemeClr val="bg1"/>
+                </a:solidFill>
+              </a:rPr>
+              <a:t>Commonjs</a:t>
+            </a:r>
+            <a:r>
+              <a:rPr lang="zh-CN" altLang="en-US" sz="2400" b="1" dirty="0">
+                <a:solidFill>
+                  <a:schemeClr val="bg1"/>
+                </a:solidFill>
+              </a:rPr>
+              <a:t> 提出的 </a:t>
+            </a:r>
+            <a:r>
+              <a:rPr lang="en-US" altLang="zh-CN" sz="2400" b="1" dirty="0">
+                <a:solidFill>
+                  <a:schemeClr val="bg1"/>
+                </a:solidFill>
+              </a:rPr>
+              <a:t>Promises/A</a:t>
+            </a:r>
+            <a:r>
+              <a:rPr lang="zh-CN" altLang="en-US" sz="2400" b="1" dirty="0">
+                <a:solidFill>
+                  <a:schemeClr val="bg1"/>
+                </a:solidFill>
+              </a:rPr>
+              <a:t> 规范。但是这一规范仍然存在一些不足，因此后来社区基于这一规范提出了 </a:t>
+            </a:r>
+            <a:r>
+              <a:rPr lang="en-US" altLang="zh-CN" sz="2400" b="1" dirty="0">
+                <a:solidFill>
+                  <a:schemeClr val="bg1"/>
+                </a:solidFill>
+              </a:rPr>
+              <a:t>plus </a:t>
+            </a:r>
+            <a:r>
+              <a:rPr lang="zh-CN" altLang="en-US" sz="2400" b="1" dirty="0">
+                <a:solidFill>
+                  <a:schemeClr val="bg1"/>
+                </a:solidFill>
+              </a:rPr>
+              <a:t>规范，即 </a:t>
+            </a:r>
+            <a:r>
+              <a:rPr lang="en-US" altLang="zh-CN" sz="2400" b="1" dirty="0">
+                <a:solidFill>
+                  <a:schemeClr val="bg1"/>
+                </a:solidFill>
+                <a:hlinkClick r:id="rId3">
+                  <a:extLst>
+                    <a:ext uri="{A12FA001-AC4F-418D-AE19-62706E023703}">
+                      <ahyp:hlinkClr xmlns:ahyp="http://schemas.microsoft.com/office/drawing/2018/hyperlinkcolor" val="tx"/>
+                    </a:ext>
+                  </a:extLst>
+                </a:hlinkClick>
+              </a:rPr>
+              <a:t>Promises/A+ </a:t>
+            </a:r>
+            <a:r>
+              <a:rPr lang="zh-CN" altLang="en-US" sz="2400" b="1" dirty="0">
+                <a:solidFill>
+                  <a:schemeClr val="bg1"/>
+                </a:solidFill>
+                <a:hlinkClick r:id="rId3">
+                  <a:extLst>
+                    <a:ext uri="{A12FA001-AC4F-418D-AE19-62706E023703}">
+                      <ahyp:hlinkClr xmlns:ahyp="http://schemas.microsoft.com/office/drawing/2018/hyperlinkcolor" val="tx"/>
+                    </a:ext>
+                  </a:extLst>
+                </a:hlinkClick>
+              </a:rPr>
+              <a:t>规范</a:t>
+            </a:r>
+            <a:r>
+              <a:rPr lang="zh-CN" altLang="en-US" sz="2400" b="1" dirty="0">
+                <a:solidFill>
+                  <a:schemeClr val="bg1"/>
+                </a:solidFill>
+              </a:rPr>
+              <a:t>，这一规范得到了社区的一致认可。</a:t>
+            </a:r>
+            <a:r>
+              <a:rPr lang="en-US" altLang="zh-CN" sz="2400" b="1" dirty="0">
+                <a:solidFill>
+                  <a:schemeClr val="bg1"/>
+                </a:solidFill>
+              </a:rPr>
+              <a:t>ES6</a:t>
+            </a:r>
+            <a:r>
+              <a:rPr lang="zh-CN" altLang="en-US" sz="2400" b="1" dirty="0">
+                <a:solidFill>
+                  <a:schemeClr val="bg1"/>
+                </a:solidFill>
+              </a:rPr>
+              <a:t> 中的 </a:t>
+            </a:r>
+            <a:r>
+              <a:rPr lang="en-US" altLang="zh-CN" sz="2400" b="1" dirty="0">
+                <a:solidFill>
+                  <a:schemeClr val="bg1"/>
+                </a:solidFill>
+              </a:rPr>
+              <a:t>Promise</a:t>
+            </a:r>
+            <a:r>
+              <a:rPr lang="zh-CN" altLang="en-US" sz="2400" b="1" dirty="0">
+                <a:solidFill>
+                  <a:schemeClr val="bg1"/>
+                </a:solidFill>
+              </a:rPr>
+              <a:t> 就是基于此规范为标准实现的</a:t>
+            </a:r>
             <a:endParaRPr lang="en-US" altLang="zh-CN" sz="2400" b="1" dirty="0">
               <a:solidFill>
                 <a:schemeClr val="bg1"/>
@@ -5221,24 +5355,6 @@
             </a:endParaRPr>
           </a:p>
           <a:p>
-            <a:r>
-              <a:rPr lang="en-US" altLang="zh-CN" sz="2400" b="1" dirty="0">
-                <a:solidFill>
-                  <a:schemeClr val="bg1"/>
-                </a:solidFill>
-                <a:hlinkClick r:id="rId3"/>
-              </a:rPr>
-              <a:t>Promises/A+</a:t>
-            </a:r>
-            <a:r>
-              <a:rPr lang="zh-CN" altLang="en-US" sz="2400" b="1" dirty="0">
-                <a:solidFill>
-                  <a:schemeClr val="bg1"/>
-                </a:solidFill>
-                <a:hlinkClick r:id="rId3"/>
-              </a:rPr>
-              <a:t> 原文</a:t>
-            </a:r>
             <a:endParaRPr lang="en-US" altLang="zh-CN" sz="2400" b="1" dirty="0">
               <a:solidFill>
                 <a:schemeClr val="bg1"/>
@@ -5261,6 +5377,31 @@
                   <a:schemeClr val="bg1"/>
                 </a:solidFill>
                 <a:hlinkClick r:id="rId4"/>
+              </a:rPr>
+              <a:t> 原文</a:t>
+            </a:r>
+            <a:endParaRPr lang="en-US" altLang="zh-CN" sz="2400" b="1" dirty="0">
+              <a:solidFill>
+                <a:schemeClr val="bg1"/>
+              </a:solidFill>
+            </a:endParaRPr>
+          </a:p>
+          <a:p>
+            <a:r>
+              <a:rPr lang="en-US" altLang="zh-CN" sz="2400" b="1" dirty="0">
+                <a:solidFill>
+                  <a:schemeClr val="bg1"/>
+                </a:solidFill>
+                <a:hlinkClick r:id="rId5"/>
+              </a:rPr>
+              <a:t>Promises/A+</a:t>
+            </a:r>
+            <a:r>
+              <a:rPr lang="zh-CN" altLang="en-US" sz="2400" b="1" dirty="0">
+                <a:solidFill>
+                  <a:schemeClr val="bg1"/>
+                </a:solidFill>
+                <a:hlinkClick r:id="rId5"/>
               </a:rPr>
               <a:t> 规范（中文翻译）</a:t>
             </a:r>
@@ -5439,6 +5580,147 @@
   <p:clrMapOvr>
     <a:masterClrMapping/>
   </p:clrMapOvr>
+  <p:timing>
+    <p:tnLst>
+      <p:par>
+        <p:cTn id="1" dur="indefinite" restart="never" nodeType="tmRoot">
+          <p:childTnLst>
+            <p:seq concurrent="1" nextAc="seek">
+              <p:cTn id="2" dur="indefinite" nodeType="mainSeq">
+                <p:childTnLst>
+                  <p:par>
+                    <p:cTn id="3" fill="hold">
+                      <p:stCondLst>
+                        <p:cond delay="indefinite"/>
+                      </p:stCondLst>
+                      <p:childTnLst>
+                        <p:par>
+                          <p:cTn id="4" fill="hold">
+                            <p:stCondLst>
+                              <p:cond delay="0"/>
+                            </p:stCondLst>
+                            <p:childTnLst>
+                              <p:par>
+                                <p:cTn id="5" presetID="1" presetClass="entr" presetSubtype="0" fill="hold" nodeType="clickEffect">
+                                  <p:stCondLst>
+                                    <p:cond delay="0"/>
+                                  </p:stCondLst>
+                                  <p:childTnLst>
+                                    <p:set>
+                                      <p:cBhvr>
+                                        <p:cTn id="6" dur="1" fill="hold">
+                                          <p:stCondLst>
+                                            <p:cond delay="0"/>
+                                          </p:stCondLst>
+                                        </p:cTn>
+                                        <p:tgtEl>
+                                          <p:spTgt spid="5">
+                                            <p:txEl>
+                                              <p:pRg st="2" end="2"/>
+                                            </p:txEl>
+                                          </p:spTgt>
+                                        </p:tgtEl>
+                                        <p:attrNameLst>
+                                          <p:attrName>style.visibility</p:attrName>
+                                        </p:attrNameLst>
+                                      </p:cBhvr>
+                                      <p:to>
+                                        <p:strVal val="visible"/>
+                                      </p:to>
+                                    </p:set>
+                                  </p:childTnLst>
+                                </p:cTn>
+                              </p:par>
+                              <p:par>
+                                <p:cTn id="7" presetID="1" presetClass="entr" presetSubtype="0" fill="hold" nodeType="withEffect">
+                                  <p:stCondLst>
+                                    <p:cond delay="0"/>
+                                  </p:stCondLst>
+                                  <p:childTnLst>
+                                    <p:set>
+                                      <p:cBhvr>
+                                        <p:cTn id="8" dur="1" fill="hold">
+                                          <p:stCondLst>
+                                            <p:cond delay="0"/>
+                                          </p:stCondLst>
+                                        </p:cTn>
+                                        <p:tgtEl>
+                                          <p:spTgt spid="5">
+                                            <p:txEl>
+                                              <p:pRg st="4" end="4"/>
+                                            </p:txEl>
+                                          </p:spTgt>
+                                        </p:tgtEl>
+                                        <p:attrNameLst>
+                                          <p:attrName>style.visibility</p:attrName>
+                                        </p:attrNameLst>
+                                      </p:cBhvr>
+                                      <p:to>
+                                        <p:strVal val="visible"/>
+                                      </p:to>
+                                    </p:set>
+                                  </p:childTnLst>
+                                </p:cTn>
+                              </p:par>
+                              <p:par>
+                                <p:cTn id="9" presetID="1" presetClass="entr" presetSubtype="0" fill="hold" nodeType="withEffect">
+                                  <p:stCondLst>
+                                    <p:cond delay="0"/>
+                                  </p:stCondLst>
+                                  <p:childTnLst>
+                                    <p:set>
+                                      <p:cBhvr>
+                                        <p:cTn id="10" dur="1" fill="hold">
+                                          <p:stCondLst>
+                                            <p:cond delay="0"/>
+                                          </p:stCondLst>
+                                        </p:cTn>
+                                        <p:tgtEl>
+                                          <p:spTgt spid="5">
+                                            <p:txEl>
+                                              <p:pRg st="5" end="5"/>
+                                            </p:txEl>
+                                          </p:spTgt>
+                                        </p:tgtEl>
+                                        <p:attrNameLst>
+                                          <p:attrName>style.visibility</p:attrName>
+                                        </p:attrNameLst>
+                                      </p:cBhvr>
+                                      <p:to>
+                                        <p:strVal val="visible"/>
+                                      </p:to>
+                                    </p:set>
+                                  </p:childTnLst>
+                                </p:cTn>
+                              </p:par>
+                            </p:childTnLst>
+                          </p:cTn>
+                        </p:par>
+                      </p:childTnLst>
+                    </p:cTn>
+                  </p:par>
+                </p:childTnLst>
+              </p:cTn>
+              <p:prevCondLst>
+                <p:cond evt="onPrev" delay="0">
+                  <p:tgtEl>
+                    <p:sldTgt/>
+                  </p:tgtEl>
+                </p:cond>
+              </p:prevCondLst>
+              <p:nextCondLst>
+                <p:cond evt="onNext" delay="0">
+                  <p:tgtEl>
+                    <p:sldTgt/>
+                  </p:tgtEl>
+                </p:cond>
+              </p:nextCondLst>
+            </p:seq>
+          </p:childTnLst>
+        </p:cTn>
+      </p:par>
+    </p:tnLst>
+  </p:timing>
 </p:sld>
 </file>
 

</xml_diff>